<commit_message>
Fix presentation. Add example with common tags.
</commit_message>
<xml_diff>
--- a/00-presentation/Frontend 101.pptx
+++ b/00-presentation/Frontend 101.pptx
@@ -231,7 +231,7 @@
           <a:p>
             <a:fld id="{FE6E0087-205E-475D-B9F7-441EAED58169}" type="datetimeFigureOut">
               <a:rPr lang="ru-RU" smtClean="0"/>
-              <a:t>09.10.2019</a:t>
+              <a:t>11.10.2019</a:t>
             </a:fld>
             <a:endParaRPr lang="ru-RU"/>
           </a:p>
@@ -764,7 +764,7 @@
           <a:p>
             <a:fld id="{0D602453-4147-4C7A-BDB0-0580C07D47BF}" type="datetimeFigureOut">
               <a:rPr lang="ru-RU" smtClean="0"/>
-              <a:t>09.10.2019</a:t>
+              <a:t>11.10.2019</a:t>
             </a:fld>
             <a:endParaRPr lang="ru-RU"/>
           </a:p>
@@ -934,7 +934,7 @@
           <a:p>
             <a:fld id="{0D602453-4147-4C7A-BDB0-0580C07D47BF}" type="datetimeFigureOut">
               <a:rPr lang="ru-RU" smtClean="0"/>
-              <a:t>09.10.2019</a:t>
+              <a:t>11.10.2019</a:t>
             </a:fld>
             <a:endParaRPr lang="ru-RU"/>
           </a:p>
@@ -1114,7 +1114,7 @@
           <a:p>
             <a:fld id="{0D602453-4147-4C7A-BDB0-0580C07D47BF}" type="datetimeFigureOut">
               <a:rPr lang="ru-RU" smtClean="0"/>
-              <a:t>09.10.2019</a:t>
+              <a:t>11.10.2019</a:t>
             </a:fld>
             <a:endParaRPr lang="ru-RU"/>
           </a:p>
@@ -1284,7 +1284,7 @@
           <a:p>
             <a:fld id="{0D602453-4147-4C7A-BDB0-0580C07D47BF}" type="datetimeFigureOut">
               <a:rPr lang="ru-RU" smtClean="0"/>
-              <a:t>09.10.2019</a:t>
+              <a:t>11.10.2019</a:t>
             </a:fld>
             <a:endParaRPr lang="ru-RU"/>
           </a:p>
@@ -1530,7 +1530,7 @@
           <a:p>
             <a:fld id="{0D602453-4147-4C7A-BDB0-0580C07D47BF}" type="datetimeFigureOut">
               <a:rPr lang="ru-RU" smtClean="0"/>
-              <a:t>09.10.2019</a:t>
+              <a:t>11.10.2019</a:t>
             </a:fld>
             <a:endParaRPr lang="ru-RU"/>
           </a:p>
@@ -1818,7 +1818,7 @@
           <a:p>
             <a:fld id="{0D602453-4147-4C7A-BDB0-0580C07D47BF}" type="datetimeFigureOut">
               <a:rPr lang="ru-RU" smtClean="0"/>
-              <a:t>09.10.2019</a:t>
+              <a:t>11.10.2019</a:t>
             </a:fld>
             <a:endParaRPr lang="ru-RU"/>
           </a:p>
@@ -2240,7 +2240,7 @@
           <a:p>
             <a:fld id="{0D602453-4147-4C7A-BDB0-0580C07D47BF}" type="datetimeFigureOut">
               <a:rPr lang="ru-RU" smtClean="0"/>
-              <a:t>09.10.2019</a:t>
+              <a:t>11.10.2019</a:t>
             </a:fld>
             <a:endParaRPr lang="ru-RU"/>
           </a:p>
@@ -2358,7 +2358,7 @@
           <a:p>
             <a:fld id="{0D602453-4147-4C7A-BDB0-0580C07D47BF}" type="datetimeFigureOut">
               <a:rPr lang="ru-RU" smtClean="0"/>
-              <a:t>09.10.2019</a:t>
+              <a:t>11.10.2019</a:t>
             </a:fld>
             <a:endParaRPr lang="ru-RU"/>
           </a:p>
@@ -2453,7 +2453,7 @@
           <a:p>
             <a:fld id="{0D602453-4147-4C7A-BDB0-0580C07D47BF}" type="datetimeFigureOut">
               <a:rPr lang="ru-RU" smtClean="0"/>
-              <a:t>09.10.2019</a:t>
+              <a:t>11.10.2019</a:t>
             </a:fld>
             <a:endParaRPr lang="ru-RU"/>
           </a:p>
@@ -2730,7 +2730,7 @@
           <a:p>
             <a:fld id="{0D602453-4147-4C7A-BDB0-0580C07D47BF}" type="datetimeFigureOut">
               <a:rPr lang="ru-RU" smtClean="0"/>
-              <a:t>09.10.2019</a:t>
+              <a:t>11.10.2019</a:t>
             </a:fld>
             <a:endParaRPr lang="ru-RU"/>
           </a:p>
@@ -2983,7 +2983,7 @@
           <a:p>
             <a:fld id="{0D602453-4147-4C7A-BDB0-0580C07D47BF}" type="datetimeFigureOut">
               <a:rPr lang="ru-RU" smtClean="0"/>
-              <a:t>09.10.2019</a:t>
+              <a:t>11.10.2019</a:t>
             </a:fld>
             <a:endParaRPr lang="ru-RU"/>
           </a:p>
@@ -3196,7 +3196,7 @@
           <a:p>
             <a:fld id="{0D602453-4147-4C7A-BDB0-0580C07D47BF}" type="datetimeFigureOut">
               <a:rPr lang="ru-RU" smtClean="0"/>
-              <a:t>09.10.2019</a:t>
+              <a:t>11.10.2019</a:t>
             </a:fld>
             <a:endParaRPr lang="ru-RU"/>
           </a:p>
@@ -4739,7 +4739,15 @@
             </a:r>
             <a:r>
               <a:rPr lang="ru-RU" dirty="0" smtClean="0"/>
-              <a:t>для всех, каждый товар отдельный </a:t>
+              <a:t>для </a:t>
+            </a:r>
+            <a:r>
+              <a:rPr lang="ru-RU" dirty="0" smtClean="0"/>
+              <a:t>всех товаров, </a:t>
+            </a:r>
+            <a:r>
+              <a:rPr lang="ru-RU" dirty="0" smtClean="0"/>
+              <a:t>каждый товар отдельный </a:t>
             </a:r>
             <a:r>
               <a:rPr lang="en-US" dirty="0" smtClean="0"/>

</xml_diff>